<commit_message>
Added Yong's portion of midterm report
</commit_message>
<xml_diff>
--- a/Writing/GROUP/Midterm Progress Report/Slide Presentation.pptx
+++ b/Writing/GROUP/Midterm Progress Report/Slide Presentation.pptx
@@ -1263,7 +1263,7 @@
             </a:r>
             <a:r>
               <a:rPr lang="en"/>
-              <a:t>++ coding so hopefully the parser integrates into our application without a problem. Once we implement the parser code, we will be able to attach the parsed data to the objects in Unreal Engine. This means members will be generated as their own unique object nodes, with a text attached to them displaying their names, and they will be connected by spline pipelines which will connect them by their determined relationship with one another. However, there is a small glitch with the spline pipelines and adding mesh points wrong, which causes an additional pipe to emerge from the original pipeline. Using older blueprints has been a challenging factor because many of them might not be completely applicable with the current version of Unreal Engine. Once the main display is completely implemented, we will be able to integrate a menu bar and buttons for extra feature functionality. The menu bar will be a static window and fit the screen regardless of how the user interacts with the data tree. Extra feature functionality includes toggling between direct and full tree view, finding a common ancestor between two nodes, and finally entering VR mode. Toggling between the direct and full tree feature will be initiated by selecting a member and then clicking on direct lineage. Nodes will then display all their ancestors above them so that they are being displayed as a full binary tree (as record allows at least) where each node is attached to two parents. The common ancestor function will be initiated when the user clicks on the button, they can select two members of their choice. Then the common ancestor will be highlighted and the pipeline pathway to the selected nodes will also be highlighted. Once we have accomplish all the features on the desktop application, we will transfer it over into a VR mode. Since the functionality of the features are the same and the objects are already created to be 3D, the transition should not be too much of a difference. The biggest change would be interacting with the nodes in VR. As mentioned earlier, instead of having a menu bar, the user will be able to access the menu through the VR controller. Scrolling across the screen and zooming in and out will still apply for the user, however they won’t be able to pass a certain point. This way they don’t venture off too far and don’t physically interfare with the ancestry tree objects. </a:t>
+              <a:t>++ coding so hopefully the parser integrates into our application without a problem. Once we implement the parser code, we will be able to attach the parsed data to the objects in Unreal Engine. This means members will be generated as their own unique object nodes, with a text attached to them displaying their names, and they will be connected by spline pipelines which will connect them by their determined relationship with one another. However, there is a small glitch with the spline pipelines and adding mesh points wrong, which causes an additional pipe to emerge from the original pipeline. Using older blueprints has been a challenging factor because many of them might not be completely applicable with the current version of Unreal Engine. Once the main display is completely implemented, we will be able to integrate a menu bar and buttons for extra feature functionality. The menu bar will be a static window and fit the screen regardless of how the user interacts with the data tree. Extra feature functionality includes toggling between direct and full tree view, finding a common ancestor between two nodes, and finally entering VR mode. Toggling between the direct and full tree feature will be initiated by selecting a member and then clicking on direct lineage. The application will then display all of their ancestors nodes above the selected member so that they are being displayed as a full binary tree (or at least as record allows) where each node is attached to two parents. The common ancestor function will be initiated when the user clicks on the corresponding button, then they will be able to manually select two members of their choice. Then their common ancestor will be highlighted and along with the pipeline pathway to the selected members. Once we have accomplish all the features on the desktop application, we will transfer it over into a VR application. Since the functionality of the features are the same and the objects are already created to be 3D, the transition should not be too much of a difference. The biggest change would be interacting with the nodes in VR. As mentioned earlier, instead of having a menu bar, the user will be able to access the menu through the VR controller. Scrolling across the screen and zooming in and out will still apply for the user, however they won’t be able to pass a certain point. This way they don’t venture off too far and don’t physically interfare with the ancestry tree objects. </a:t>
             </a:r>
             <a:endParaRPr/>
           </a:p>
@@ -1392,7 +1392,8 @@
               <a:buNone/>
             </a:pPr>
             <a:r>
-              <a:t/>
+              <a:rPr lang="en"/>
+              <a:t>51s</a:t>
             </a:r>
             <a:endParaRPr/>
           </a:p>
@@ -1778,6 +1779,37 @@
               <a:spcAft>
                 <a:spcPts val="0"/>
               </a:spcAft>
+              <a:buNone/>
+            </a:pPr>
+            <a:r>
+              <a:rPr lang="en"/>
+              <a:t>The parser is implemented and it is capable of gathering all the needed information. The information gathered is stored in a struct array. The struct array contains six variables and that is id, name, Sprouse, father, mother, and child. It is storing information about the individual and names of people who are directly related to the individual. Therefore, the individuals are somewhat linked together, but there are problems doing it this way. First of all, there can be duplicate names in the family which will cause problems. If we change the fields from storing names to storing the identification of individuals could fix this problem but it makes names more difficult to access. Therefore, I will start implementing the tree structure for storing the information which is more easier to access. I have implemented a function inside the parser to find the root nodes of the ancestry tree. The root nodes are on top of the family tree and their parent's information doesn't exist in the GEDCOM file. Therefore, the husband and wife with no information about their parents are the root nodes. This will be helpful in displaying the ancestry tree. I will start working on the display after I get the tree structure implemented. </a:t>
+            </a:r>
+            <a:endParaRPr/>
+          </a:p>
+          <a:p>
+            <a:pPr indent="0" lvl="0" marL="0">
+              <a:spcBef>
+                <a:spcPts val="0"/>
+              </a:spcBef>
+              <a:spcAft>
+                <a:spcPts val="0"/>
+              </a:spcAft>
+              <a:buNone/>
+            </a:pPr>
+            <a:r>
+              <a:t/>
+            </a:r>
+            <a:endParaRPr/>
+          </a:p>
+          <a:p>
+            <a:pPr indent="0" lvl="0" marL="0">
+              <a:spcBef>
+                <a:spcPts val="0"/>
+              </a:spcBef>
+              <a:spcAft>
+                <a:spcPts val="0"/>
+              </a:spcAft>
               <a:buClr>
                 <a:schemeClr val="dk2"/>
               </a:buClr>
@@ -1787,7 +1819,7 @@
             </a:pPr>
             <a:r>
               <a:rPr lang="en"/>
-              <a:t>The parser is implemented and it is capable of gathering all the needed information. The information gathered is stored in a struct array. The struct array contains six variables and that is id, name, Sprouse, father, mother, and child. It is storing information about the individual and names of people who are directly related to the individual. Therefore, the individuals are somewhat linked together, but there are problems doing it this way. First of all, there can be duplicate names in the family which will cause problems. If we change the fields from storing names to storing the identification of individuals could fix this problem but it makes names more difficult to access. Therefore, I will start implementing the tree structure for storing the information which is more easier to access. I have implemented a function inside the parser to find the root nodes of the ancestry tree. The root nodes are on top of the family tree and their parent's information doesn't exist in the GEDCOM file. Therefore, the husband and wife with no information about their parents are the root nodes. This will be helpful in displaying the ancestry tree. I will start working on the display after I get the tree structure implemented. </a:t>
+              <a:t>1:33</a:t>
             </a:r>
             <a:endParaRPr/>
           </a:p>
@@ -8598,9 +8630,41 @@
             </a:pPr>
             <a:r>
               <a:rPr lang="en"/>
-              <a:t>Ancestry Data View</a:t>
+              <a:t>Ancestry Data Viewer</a:t>
             </a:r>
             <a:endParaRPr/>
+          </a:p>
+          <a:p>
+            <a:pPr indent="0" lvl="0" marL="0">
+              <a:spcBef>
+                <a:spcPts val="0"/>
+              </a:spcBef>
+              <a:spcAft>
+                <a:spcPts val="0"/>
+              </a:spcAft>
+              <a:buNone/>
+            </a:pPr>
+            <a:r>
+              <a:rPr lang="en" sz="3000"/>
+              <a:t>Winter 18</a:t>
+            </a:r>
+            <a:endParaRPr sz="3000"/>
+          </a:p>
+          <a:p>
+            <a:pPr indent="0" lvl="0" marL="0">
+              <a:spcBef>
+                <a:spcPts val="0"/>
+              </a:spcBef>
+              <a:spcAft>
+                <a:spcPts val="0"/>
+              </a:spcAft>
+              <a:buNone/>
+            </a:pPr>
+            <a:r>
+              <a:rPr lang="en" sz="3000"/>
+              <a:t>Midterm Progress Report</a:t>
+            </a:r>
+            <a:endParaRPr sz="3000"/>
           </a:p>
         </p:txBody>
       </p:sp>
@@ -9227,17 +9291,129 @@
           </a:bodyPr>
           <a:lstStyle/>
           <a:p>
-            <a:pPr indent="0" lvl="0" marL="0">
-              <a:spcBef>
-                <a:spcPts val="0"/>
-              </a:spcBef>
-              <a:spcAft>
-                <a:spcPts val="1600"/>
-              </a:spcAft>
-              <a:buNone/>
+            <a:pPr indent="-342900" lvl="0" marL="457200" rtl="0">
+              <a:spcBef>
+                <a:spcPts val="0"/>
+              </a:spcBef>
+              <a:spcAft>
+                <a:spcPts val="0"/>
+              </a:spcAft>
+              <a:buSzPts val="1800"/>
+              <a:buChar char="●"/>
             </a:pPr>
             <a:r>
-              <a:t/>
+              <a:rPr lang="en"/>
+              <a:t>UI assets, functionalities, integrate</a:t>
+            </a:r>
+            <a:endParaRPr/>
+          </a:p>
+          <a:p>
+            <a:pPr indent="-342900" lvl="0" marL="457200" rtl="0">
+              <a:spcBef>
+                <a:spcPts val="0"/>
+              </a:spcBef>
+              <a:spcAft>
+                <a:spcPts val="0"/>
+              </a:spcAft>
+              <a:buSzPts val="1800"/>
+              <a:buChar char="●"/>
+            </a:pPr>
+            <a:r>
+              <a:rPr lang="en"/>
+              <a:t>Create selected node system</a:t>
+            </a:r>
+            <a:endParaRPr/>
+          </a:p>
+          <a:p>
+            <a:pPr indent="-342900" lvl="0" marL="457200" rtl="0">
+              <a:spcBef>
+                <a:spcPts val="0"/>
+              </a:spcBef>
+              <a:spcAft>
+                <a:spcPts val="0"/>
+              </a:spcAft>
+              <a:buSzPts val="1800"/>
+              <a:buChar char="●"/>
+            </a:pPr>
+            <a:r>
+              <a:rPr lang="en"/>
+              <a:t>Create display algorithm</a:t>
+            </a:r>
+            <a:endParaRPr/>
+          </a:p>
+          <a:p>
+            <a:pPr indent="-342900" lvl="0" marL="457200" rtl="0">
+              <a:spcBef>
+                <a:spcPts val="0"/>
+              </a:spcBef>
+              <a:spcAft>
+                <a:spcPts val="0"/>
+              </a:spcAft>
+              <a:buSzPts val="1800"/>
+              <a:buChar char="●"/>
+            </a:pPr>
+            <a:r>
+              <a:rPr lang="en"/>
+              <a:t>Implement display algorithm with Unreal</a:t>
+            </a:r>
+            <a:endParaRPr/>
+          </a:p>
+          <a:p>
+            <a:pPr indent="-342900" lvl="0" marL="457200" rtl="0">
+              <a:spcBef>
+                <a:spcPts val="0"/>
+              </a:spcBef>
+              <a:spcAft>
+                <a:spcPts val="0"/>
+              </a:spcAft>
+              <a:buSzPts val="1800"/>
+              <a:buChar char="●"/>
+            </a:pPr>
+            <a:r>
+              <a:rPr lang="en"/>
+              <a:t>Find VR hand asset for VR UI</a:t>
+            </a:r>
+            <a:endParaRPr/>
+          </a:p>
+          <a:p>
+            <a:pPr indent="-342900" lvl="0" marL="457200" rtl="0">
+              <a:spcBef>
+                <a:spcPts val="0"/>
+              </a:spcBef>
+              <a:spcAft>
+                <a:spcPts val="0"/>
+              </a:spcAft>
+              <a:buSzPts val="1800"/>
+              <a:buChar char="●"/>
+            </a:pPr>
+            <a:r>
+              <a:rPr lang="en"/>
+              <a:t>Implement hand pointing </a:t>
+            </a:r>
+            <a:r>
+              <a:rPr lang="en"/>
+              <a:t>for </a:t>
+            </a:r>
+            <a:r>
+              <a:rPr lang="en"/>
+              <a:t>selection</a:t>
+            </a:r>
+            <a:endParaRPr/>
+          </a:p>
+          <a:p>
+            <a:pPr indent="-342900" lvl="0" marL="457200" rtl="0">
+              <a:spcBef>
+                <a:spcPts val="0"/>
+              </a:spcBef>
+              <a:spcAft>
+                <a:spcPts val="0"/>
+              </a:spcAft>
+              <a:buSzPts val="1800"/>
+              <a:buChar char="●"/>
+            </a:pPr>
+            <a:r>
+              <a:rPr lang="en"/>
+              <a:t>Perform aesthetics and usability testing for UI</a:t>
             </a:r>
             <a:endParaRPr/>
           </a:p>

</xml_diff>